<commit_message>
Add 14 lesson begin
</commit_message>
<xml_diff>
--- a/Course.pptx
+++ b/Course.pptx
@@ -5,7 +5,7 @@
     <p:sldMasterId id="2147483648" r:id="rId1"/>
   </p:sldMasterIdLst>
   <p:notesMasterIdLst>
-    <p:notesMasterId r:id="rId130"/>
+    <p:notesMasterId r:id="rId134"/>
   </p:notesMasterIdLst>
   <p:sldIdLst>
     <p:sldId id="256" r:id="rId2"/>
@@ -136,6 +136,10 @@
     <p:sldId id="382" r:id="rId127"/>
     <p:sldId id="383" r:id="rId128"/>
     <p:sldId id="384" r:id="rId129"/>
+    <p:sldId id="385" r:id="rId130"/>
+    <p:sldId id="386" r:id="rId131"/>
+    <p:sldId id="387" r:id="rId132"/>
+    <p:sldId id="388" r:id="rId133"/>
   </p:sldIdLst>
   <p:sldSz cx="12192000" cy="6858000"/>
   <p:notesSz cx="6858000" cy="9144000"/>
@@ -1160,7 +1164,7 @@
           <a:p>
             <a:fld id="{2EE8E8F7-1DBA-4282-96A9-47FA334D89F2}" type="datetimeFigureOut">
               <a:rPr lang="ru-RU" smtClean="0"/>
-              <a:t>21.07.2020</a:t>
+              <a:t>23.07.2020</a:t>
             </a:fld>
             <a:endParaRPr lang="ru-RU"/>
           </a:p>
@@ -17084,15 +17088,6 @@
               </a:rPr>
               <a:t> задачей является выборка подмножества значений из объекта.*</a:t>
             </a:r>
-            <a:endParaRPr lang="ru-RU" sz="1200" b="0" i="0" kern="1200" dirty="0" smtClean="0">
-              <a:solidFill>
-                <a:schemeClr val="tx1"/>
-              </a:solidFill>
-              <a:effectLst/>
-              <a:latin typeface="+mn-lt"/>
-              <a:ea typeface="+mn-ea"/>
-              <a:cs typeface="+mn-cs"/>
-            </a:endParaRPr>
           </a:p>
         </p:txBody>
       </p:sp>
@@ -18047,6 +18042,261 @@
 </p:notes>
 </file>
 
+<file path=ppt/notesSlides/notesSlide69.xml><?xml version="1.0" encoding="utf-8"?>
+<p:notes xmlns:a="http://schemas.openxmlformats.org/drawingml/2006/main" xmlns:r="http://schemas.openxmlformats.org/officeDocument/2006/relationships" xmlns:p="http://schemas.openxmlformats.org/presentationml/2006/main">
+  <p:cSld>
+    <p:spTree>
+      <p:nvGrpSpPr>
+        <p:cNvPr id="1" name=""/>
+        <p:cNvGrpSpPr/>
+        <p:nvPr/>
+      </p:nvGrpSpPr>
+      <p:grpSpPr>
+        <a:xfrm>
+          <a:off x="0" y="0"/>
+          <a:ext cx="0" cy="0"/>
+          <a:chOff x="0" y="0"/>
+          <a:chExt cx="0" cy="0"/>
+        </a:xfrm>
+      </p:grpSpPr>
+      <p:sp>
+        <p:nvSpPr>
+          <p:cNvPr id="2" name="Образ слайда 1"/>
+          <p:cNvSpPr>
+            <a:spLocks noGrp="1" noRot="1" noChangeAspect="1"/>
+          </p:cNvSpPr>
+          <p:nvPr>
+            <p:ph type="sldImg"/>
+          </p:nvPr>
+        </p:nvSpPr>
+        <p:spPr/>
+      </p:sp>
+      <p:sp>
+        <p:nvSpPr>
+          <p:cNvPr id="3" name="Заметки 2"/>
+          <p:cNvSpPr>
+            <a:spLocks noGrp="1"/>
+          </p:cNvSpPr>
+          <p:nvPr>
+            <p:ph type="body" idx="1"/>
+          </p:nvPr>
+        </p:nvSpPr>
+        <p:spPr/>
+        <p:txBody>
+          <a:bodyPr/>
+          <a:lstStyle/>
+          <a:p>
+            <a:pPr rtl="0" fontAlgn="base"/>
+            <a:r>
+              <a:rPr lang="ru-RU" sz="1200" b="0" i="0" kern="1200" dirty="0" smtClean="0">
+                <a:solidFill>
+                  <a:schemeClr val="tx1"/>
+                </a:solidFill>
+                <a:effectLst/>
+                <a:latin typeface="+mn-lt"/>
+                <a:ea typeface="+mn-ea"/>
+                <a:cs typeface="+mn-cs"/>
+              </a:rPr>
+              <a:t>Урок</a:t>
+            </a:r>
+            <a:r>
+              <a:rPr lang="ru-RU" sz="1200" b="0" i="0" kern="1200" baseline="0" dirty="0" smtClean="0">
+                <a:solidFill>
+                  <a:schemeClr val="tx1"/>
+                </a:solidFill>
+                <a:effectLst/>
+                <a:latin typeface="+mn-lt"/>
+                <a:ea typeface="+mn-ea"/>
+                <a:cs typeface="+mn-cs"/>
+              </a:rPr>
+              <a:t> 14</a:t>
+            </a:r>
+          </a:p>
+          <a:p>
+            <a:pPr rtl="0" fontAlgn="base"/>
+            <a:endParaRPr lang="ru-RU" sz="1200" b="0" i="0" kern="1200" baseline="0" dirty="0" smtClean="0">
+              <a:solidFill>
+                <a:schemeClr val="tx1"/>
+              </a:solidFill>
+              <a:effectLst/>
+              <a:latin typeface="+mn-lt"/>
+              <a:ea typeface="+mn-ea"/>
+              <a:cs typeface="+mn-cs"/>
+            </a:endParaRPr>
+          </a:p>
+          <a:p>
+            <a:pPr rtl="0" fontAlgn="base"/>
+            <a:r>
+              <a:rPr lang="en-US" sz="1200" b="0" i="0" kern="1200" baseline="0" dirty="0" smtClean="0">
+                <a:solidFill>
+                  <a:schemeClr val="tx1"/>
+                </a:solidFill>
+                <a:effectLst/>
+                <a:latin typeface="+mn-lt"/>
+                <a:ea typeface="+mn-ea"/>
+                <a:cs typeface="+mn-cs"/>
+              </a:rPr>
+              <a:t>JS </a:t>
+            </a:r>
+            <a:r>
+              <a:rPr lang="ru-RU" sz="1200" b="0" i="0" kern="1200" baseline="0" dirty="0" smtClean="0">
+                <a:solidFill>
+                  <a:schemeClr val="tx1"/>
+                </a:solidFill>
+                <a:effectLst/>
+                <a:latin typeface="+mn-lt"/>
+                <a:ea typeface="+mn-ea"/>
+                <a:cs typeface="+mn-cs"/>
+              </a:rPr>
+              <a:t>достаточно гибкий язык в терминах типов (по </a:t>
+            </a:r>
+            <a:r>
+              <a:rPr lang="ru-RU" sz="1200" b="0" i="0" kern="1200" baseline="0" dirty="0" err="1" smtClean="0">
+                <a:solidFill>
+                  <a:schemeClr val="tx1"/>
+                </a:solidFill>
+                <a:effectLst/>
+                <a:latin typeface="+mn-lt"/>
+                <a:ea typeface="+mn-ea"/>
+                <a:cs typeface="+mn-cs"/>
+              </a:rPr>
+              <a:t>скольку</a:t>
+            </a:r>
+            <a:r>
+              <a:rPr lang="ru-RU" sz="1200" b="0" i="0" kern="1200" baseline="0" dirty="0" smtClean="0">
+                <a:solidFill>
+                  <a:schemeClr val="tx1"/>
+                </a:solidFill>
+                <a:effectLst/>
+                <a:latin typeface="+mn-lt"/>
+                <a:ea typeface="+mn-ea"/>
+                <a:cs typeface="+mn-cs"/>
+              </a:rPr>
+              <a:t> они отсутствуют) и позволяет превращать структуры в абсолютно разные вещи прямо на ходу</a:t>
+            </a:r>
+          </a:p>
+          <a:p>
+            <a:pPr rtl="0" fontAlgn="base"/>
+            <a:endParaRPr lang="ru-RU" sz="1200" b="0" i="0" kern="1200" baseline="0" dirty="0" smtClean="0">
+              <a:solidFill>
+                <a:schemeClr val="tx1"/>
+              </a:solidFill>
+              <a:effectLst/>
+              <a:latin typeface="+mn-lt"/>
+              <a:ea typeface="+mn-ea"/>
+              <a:cs typeface="+mn-cs"/>
+            </a:endParaRPr>
+          </a:p>
+          <a:p>
+            <a:pPr rtl="0" fontAlgn="base"/>
+            <a:endParaRPr lang="ru-RU" sz="1200" b="0" i="0" kern="1200" dirty="0" smtClean="0">
+              <a:solidFill>
+                <a:schemeClr val="tx1"/>
+              </a:solidFill>
+              <a:effectLst/>
+              <a:latin typeface="+mn-lt"/>
+              <a:ea typeface="+mn-ea"/>
+              <a:cs typeface="+mn-cs"/>
+            </a:endParaRPr>
+          </a:p>
+        </p:txBody>
+      </p:sp>
+      <p:sp>
+        <p:nvSpPr>
+          <p:cNvPr id="4" name="Номер слайда 3"/>
+          <p:cNvSpPr>
+            <a:spLocks noGrp="1"/>
+          </p:cNvSpPr>
+          <p:nvPr>
+            <p:ph type="sldNum" sz="quarter" idx="10"/>
+          </p:nvPr>
+        </p:nvSpPr>
+        <p:spPr/>
+        <p:txBody>
+          <a:bodyPr/>
+          <a:lstStyle/>
+          <a:p>
+            <a:pPr marL="0" marR="0" lvl="0" indent="0" algn="r" defTabSz="914400" rtl="0" eaLnBrk="1" fontAlgn="auto" latinLnBrk="0" hangingPunct="1">
+              <a:lnSpc>
+                <a:spcPct val="100000"/>
+              </a:lnSpc>
+              <a:spcBef>
+                <a:spcPts val="0"/>
+              </a:spcBef>
+              <a:spcAft>
+                <a:spcPts val="0"/>
+              </a:spcAft>
+              <a:buClrTx/>
+              <a:buSzTx/>
+              <a:buFontTx/>
+              <a:buNone/>
+              <a:tabLst/>
+              <a:defRPr/>
+            </a:pPr>
+            <a:fld id="{622F1C9E-D65E-417E-9FEF-9AD7ACC20294}" type="slidenum">
+              <a:rPr kumimoji="0" lang="ru-RU" sz="1200" b="0" i="0" u="none" strike="noStrike" kern="1200" cap="none" spc="0" normalizeH="0" baseline="0" noProof="0" smtClean="0">
+                <a:ln>
+                  <a:noFill/>
+                </a:ln>
+                <a:solidFill>
+                  <a:prstClr val="black"/>
+                </a:solidFill>
+                <a:effectLst/>
+                <a:uLnTx/>
+                <a:uFillTx/>
+                <a:latin typeface="Calibri" panose="020F0502020204030204"/>
+                <a:ea typeface="+mn-ea"/>
+                <a:cs typeface="+mn-cs"/>
+              </a:rPr>
+              <a:pPr marL="0" marR="0" lvl="0" indent="0" algn="r" defTabSz="914400" rtl="0" eaLnBrk="1" fontAlgn="auto" latinLnBrk="0" hangingPunct="1">
+                <a:lnSpc>
+                  <a:spcPct val="100000"/>
+                </a:lnSpc>
+                <a:spcBef>
+                  <a:spcPts val="0"/>
+                </a:spcBef>
+                <a:spcAft>
+                  <a:spcPts val="0"/>
+                </a:spcAft>
+                <a:buClrTx/>
+                <a:buSzTx/>
+                <a:buFontTx/>
+                <a:buNone/>
+                <a:tabLst/>
+                <a:defRPr/>
+              </a:pPr>
+              <a:t>129</a:t>
+            </a:fld>
+            <a:endParaRPr kumimoji="0" lang="ru-RU" sz="1200" b="0" i="0" u="none" strike="noStrike" kern="1200" cap="none" spc="0" normalizeH="0" baseline="0" noProof="0">
+              <a:ln>
+                <a:noFill/>
+              </a:ln>
+              <a:solidFill>
+                <a:prstClr val="black"/>
+              </a:solidFill>
+              <a:effectLst/>
+              <a:uLnTx/>
+              <a:uFillTx/>
+              <a:latin typeface="Calibri" panose="020F0502020204030204"/>
+              <a:ea typeface="+mn-ea"/>
+              <a:cs typeface="+mn-cs"/>
+            </a:endParaRPr>
+          </a:p>
+        </p:txBody>
+      </p:sp>
+    </p:spTree>
+    <p:extLst>
+      <p:ext uri="{BB962C8B-B14F-4D97-AF65-F5344CB8AC3E}">
+        <p14:creationId xmlns:p14="http://schemas.microsoft.com/office/powerpoint/2010/main" val="2142569005"/>
+      </p:ext>
+    </p:extLst>
+  </p:cSld>
+  <p:clrMapOvr>
+    <a:masterClrMapping/>
+  </p:clrMapOvr>
+</p:notes>
+</file>
+
 <file path=ppt/notesSlides/notesSlide7.xml><?xml version="1.0" encoding="utf-8"?>
 <p:notes xmlns:a="http://schemas.openxmlformats.org/drawingml/2006/main" xmlns:r="http://schemas.openxmlformats.org/officeDocument/2006/relationships" xmlns:p="http://schemas.openxmlformats.org/presentationml/2006/main">
   <p:cSld>
@@ -18477,6 +18727,588 @@
     <p:extLst>
       <p:ext uri="{BB962C8B-B14F-4D97-AF65-F5344CB8AC3E}">
         <p14:creationId xmlns:p14="http://schemas.microsoft.com/office/powerpoint/2010/main" val="1153176650"/>
+      </p:ext>
+    </p:extLst>
+  </p:cSld>
+  <p:clrMapOvr>
+    <a:masterClrMapping/>
+  </p:clrMapOvr>
+</p:notes>
+</file>
+
+<file path=ppt/notesSlides/notesSlide70.xml><?xml version="1.0" encoding="utf-8"?>
+<p:notes xmlns:a="http://schemas.openxmlformats.org/drawingml/2006/main" xmlns:r="http://schemas.openxmlformats.org/officeDocument/2006/relationships" xmlns:p="http://schemas.openxmlformats.org/presentationml/2006/main">
+  <p:cSld>
+    <p:spTree>
+      <p:nvGrpSpPr>
+        <p:cNvPr id="1" name=""/>
+        <p:cNvGrpSpPr/>
+        <p:nvPr/>
+      </p:nvGrpSpPr>
+      <p:grpSpPr>
+        <a:xfrm>
+          <a:off x="0" y="0"/>
+          <a:ext cx="0" cy="0"/>
+          <a:chOff x="0" y="0"/>
+          <a:chExt cx="0" cy="0"/>
+        </a:xfrm>
+      </p:grpSpPr>
+      <p:sp>
+        <p:nvSpPr>
+          <p:cNvPr id="2" name="Образ слайда 1"/>
+          <p:cNvSpPr>
+            <a:spLocks noGrp="1" noRot="1" noChangeAspect="1"/>
+          </p:cNvSpPr>
+          <p:nvPr>
+            <p:ph type="sldImg"/>
+          </p:nvPr>
+        </p:nvSpPr>
+        <p:spPr/>
+      </p:sp>
+      <p:sp>
+        <p:nvSpPr>
+          <p:cNvPr id="3" name="Заметки 2"/>
+          <p:cNvSpPr>
+            <a:spLocks noGrp="1"/>
+          </p:cNvSpPr>
+          <p:nvPr>
+            <p:ph type="body" idx="1"/>
+          </p:nvPr>
+        </p:nvSpPr>
+        <p:spPr/>
+        <p:txBody>
+          <a:bodyPr/>
+          <a:lstStyle/>
+          <a:p>
+            <a:pPr rtl="0" fontAlgn="base"/>
+            <a:r>
+              <a:rPr lang="ru-RU" sz="1200" b="0" i="0" kern="1200" baseline="0" dirty="0" smtClean="0">
+                <a:solidFill>
+                  <a:schemeClr val="tx1"/>
+                </a:solidFill>
+                <a:effectLst/>
+                <a:latin typeface="+mn-lt"/>
+                <a:ea typeface="+mn-ea"/>
+                <a:cs typeface="+mn-cs"/>
+              </a:rPr>
+              <a:t>Но что насчет </a:t>
+            </a:r>
+            <a:r>
+              <a:rPr lang="ru-RU" sz="1200" b="0" i="0" kern="1200" baseline="0" dirty="0" err="1" smtClean="0">
+                <a:solidFill>
+                  <a:schemeClr val="tx1"/>
+                </a:solidFill>
+                <a:effectLst/>
+                <a:latin typeface="+mn-lt"/>
+                <a:ea typeface="+mn-ea"/>
+                <a:cs typeface="+mn-cs"/>
+              </a:rPr>
+              <a:t>тайпскрипт</a:t>
+            </a:r>
+            <a:r>
+              <a:rPr lang="ru-RU" sz="1200" b="0" i="0" kern="1200" baseline="0" dirty="0" smtClean="0">
+                <a:solidFill>
+                  <a:schemeClr val="tx1"/>
+                </a:solidFill>
+                <a:effectLst/>
+                <a:latin typeface="+mn-lt"/>
+                <a:ea typeface="+mn-ea"/>
+                <a:cs typeface="+mn-cs"/>
+              </a:rPr>
+              <a:t>?</a:t>
+            </a:r>
+          </a:p>
+          <a:p>
+            <a:pPr rtl="0" fontAlgn="base"/>
+            <a:endParaRPr lang="ru-RU" sz="1200" b="0" i="0" kern="1200" baseline="0" dirty="0" smtClean="0">
+              <a:solidFill>
+                <a:schemeClr val="tx1"/>
+              </a:solidFill>
+              <a:effectLst/>
+              <a:latin typeface="+mn-lt"/>
+              <a:ea typeface="+mn-ea"/>
+              <a:cs typeface="+mn-cs"/>
+            </a:endParaRPr>
+          </a:p>
+          <a:p>
+            <a:pPr rtl="0" fontAlgn="base"/>
+            <a:endParaRPr lang="ru-RU" sz="1200" b="0" i="0" kern="1200" dirty="0" smtClean="0">
+              <a:solidFill>
+                <a:schemeClr val="tx1"/>
+              </a:solidFill>
+              <a:effectLst/>
+              <a:latin typeface="+mn-lt"/>
+              <a:ea typeface="+mn-ea"/>
+              <a:cs typeface="+mn-cs"/>
+            </a:endParaRPr>
+          </a:p>
+        </p:txBody>
+      </p:sp>
+      <p:sp>
+        <p:nvSpPr>
+          <p:cNvPr id="4" name="Номер слайда 3"/>
+          <p:cNvSpPr>
+            <a:spLocks noGrp="1"/>
+          </p:cNvSpPr>
+          <p:nvPr>
+            <p:ph type="sldNum" sz="quarter" idx="10"/>
+          </p:nvPr>
+        </p:nvSpPr>
+        <p:spPr/>
+        <p:txBody>
+          <a:bodyPr/>
+          <a:lstStyle/>
+          <a:p>
+            <a:pPr marL="0" marR="0" lvl="0" indent="0" algn="r" defTabSz="914400" rtl="0" eaLnBrk="1" fontAlgn="auto" latinLnBrk="0" hangingPunct="1">
+              <a:lnSpc>
+                <a:spcPct val="100000"/>
+              </a:lnSpc>
+              <a:spcBef>
+                <a:spcPts val="0"/>
+              </a:spcBef>
+              <a:spcAft>
+                <a:spcPts val="0"/>
+              </a:spcAft>
+              <a:buClrTx/>
+              <a:buSzTx/>
+              <a:buFontTx/>
+              <a:buNone/>
+              <a:tabLst/>
+              <a:defRPr/>
+            </a:pPr>
+            <a:fld id="{622F1C9E-D65E-417E-9FEF-9AD7ACC20294}" type="slidenum">
+              <a:rPr kumimoji="0" lang="ru-RU" sz="1200" b="0" i="0" u="none" strike="noStrike" kern="1200" cap="none" spc="0" normalizeH="0" baseline="0" noProof="0" smtClean="0">
+                <a:ln>
+                  <a:noFill/>
+                </a:ln>
+                <a:solidFill>
+                  <a:prstClr val="black"/>
+                </a:solidFill>
+                <a:effectLst/>
+                <a:uLnTx/>
+                <a:uFillTx/>
+                <a:latin typeface="Calibri" panose="020F0502020204030204"/>
+                <a:ea typeface="+mn-ea"/>
+                <a:cs typeface="+mn-cs"/>
+              </a:rPr>
+              <a:pPr marL="0" marR="0" lvl="0" indent="0" algn="r" defTabSz="914400" rtl="0" eaLnBrk="1" fontAlgn="auto" latinLnBrk="0" hangingPunct="1">
+                <a:lnSpc>
+                  <a:spcPct val="100000"/>
+                </a:lnSpc>
+                <a:spcBef>
+                  <a:spcPts val="0"/>
+                </a:spcBef>
+                <a:spcAft>
+                  <a:spcPts val="0"/>
+                </a:spcAft>
+                <a:buClrTx/>
+                <a:buSzTx/>
+                <a:buFontTx/>
+                <a:buNone/>
+                <a:tabLst/>
+                <a:defRPr/>
+              </a:pPr>
+              <a:t>130</a:t>
+            </a:fld>
+            <a:endParaRPr kumimoji="0" lang="ru-RU" sz="1200" b="0" i="0" u="none" strike="noStrike" kern="1200" cap="none" spc="0" normalizeH="0" baseline="0" noProof="0">
+              <a:ln>
+                <a:noFill/>
+              </a:ln>
+              <a:solidFill>
+                <a:prstClr val="black"/>
+              </a:solidFill>
+              <a:effectLst/>
+              <a:uLnTx/>
+              <a:uFillTx/>
+              <a:latin typeface="Calibri" panose="020F0502020204030204"/>
+              <a:ea typeface="+mn-ea"/>
+              <a:cs typeface="+mn-cs"/>
+            </a:endParaRPr>
+          </a:p>
+        </p:txBody>
+      </p:sp>
+    </p:spTree>
+    <p:extLst>
+      <p:ext uri="{BB962C8B-B14F-4D97-AF65-F5344CB8AC3E}">
+        <p14:creationId xmlns:p14="http://schemas.microsoft.com/office/powerpoint/2010/main" val="1302736349"/>
+      </p:ext>
+    </p:extLst>
+  </p:cSld>
+  <p:clrMapOvr>
+    <a:masterClrMapping/>
+  </p:clrMapOvr>
+</p:notes>
+</file>
+
+<file path=ppt/notesSlides/notesSlide71.xml><?xml version="1.0" encoding="utf-8"?>
+<p:notes xmlns:a="http://schemas.openxmlformats.org/drawingml/2006/main" xmlns:r="http://schemas.openxmlformats.org/officeDocument/2006/relationships" xmlns:p="http://schemas.openxmlformats.org/presentationml/2006/main">
+  <p:cSld>
+    <p:spTree>
+      <p:nvGrpSpPr>
+        <p:cNvPr id="1" name=""/>
+        <p:cNvGrpSpPr/>
+        <p:nvPr/>
+      </p:nvGrpSpPr>
+      <p:grpSpPr>
+        <a:xfrm>
+          <a:off x="0" y="0"/>
+          <a:ext cx="0" cy="0"/>
+          <a:chOff x="0" y="0"/>
+          <a:chExt cx="0" cy="0"/>
+        </a:xfrm>
+      </p:grpSpPr>
+      <p:sp>
+        <p:nvSpPr>
+          <p:cNvPr id="2" name="Образ слайда 1"/>
+          <p:cNvSpPr>
+            <a:spLocks noGrp="1" noRot="1" noChangeAspect="1"/>
+          </p:cNvSpPr>
+          <p:nvPr>
+            <p:ph type="sldImg"/>
+          </p:nvPr>
+        </p:nvSpPr>
+        <p:spPr/>
+      </p:sp>
+      <p:sp>
+        <p:nvSpPr>
+          <p:cNvPr id="3" name="Заметки 2"/>
+          <p:cNvSpPr>
+            <a:spLocks noGrp="1"/>
+          </p:cNvSpPr>
+          <p:nvPr>
+            <p:ph type="body" idx="1"/>
+          </p:nvPr>
+        </p:nvSpPr>
+        <p:spPr/>
+        <p:txBody>
+          <a:bodyPr/>
+          <a:lstStyle/>
+          <a:p>
+            <a:pPr rtl="0" fontAlgn="base"/>
+            <a:r>
+              <a:rPr lang="ru-RU" sz="1200" b="0" i="0" kern="1200" dirty="0" smtClean="0">
+                <a:solidFill>
+                  <a:schemeClr val="tx1"/>
+                </a:solidFill>
+                <a:effectLst/>
+                <a:latin typeface="+mn-lt"/>
+                <a:ea typeface="+mn-ea"/>
+                <a:cs typeface="+mn-cs"/>
+              </a:rPr>
+              <a:t>Дублировать</a:t>
+            </a:r>
+            <a:r>
+              <a:rPr lang="ru-RU" sz="1200" b="0" i="0" kern="1200" baseline="0" dirty="0" smtClean="0">
+                <a:solidFill>
+                  <a:schemeClr val="tx1"/>
+                </a:solidFill>
+                <a:effectLst/>
+                <a:latin typeface="+mn-lt"/>
+                <a:ea typeface="+mn-ea"/>
+                <a:cs typeface="+mn-cs"/>
+              </a:rPr>
+              <a:t> тип или </a:t>
+            </a:r>
+            <a:r>
+              <a:rPr lang="ru-RU" sz="1200" b="0" i="0" kern="1200" baseline="0" dirty="0" err="1" smtClean="0">
+                <a:solidFill>
+                  <a:schemeClr val="tx1"/>
+                </a:solidFill>
+                <a:effectLst/>
+                <a:latin typeface="+mn-lt"/>
+                <a:ea typeface="+mn-ea"/>
+                <a:cs typeface="+mn-cs"/>
+              </a:rPr>
+              <a:t>маппед</a:t>
+            </a:r>
+            <a:r>
+              <a:rPr lang="ru-RU" sz="1200" b="0" i="0" kern="1200" baseline="0" dirty="0" smtClean="0">
+                <a:solidFill>
+                  <a:schemeClr val="tx1"/>
+                </a:solidFill>
+                <a:effectLst/>
+                <a:latin typeface="+mn-lt"/>
+                <a:ea typeface="+mn-ea"/>
+                <a:cs typeface="+mn-cs"/>
+              </a:rPr>
+              <a:t> тип</a:t>
+            </a:r>
+            <a:endParaRPr lang="ru-RU" sz="1200" b="0" i="0" kern="1200" dirty="0" smtClean="0">
+              <a:solidFill>
+                <a:schemeClr val="tx1"/>
+              </a:solidFill>
+              <a:effectLst/>
+              <a:latin typeface="+mn-lt"/>
+              <a:ea typeface="+mn-ea"/>
+              <a:cs typeface="+mn-cs"/>
+            </a:endParaRPr>
+          </a:p>
+        </p:txBody>
+      </p:sp>
+      <p:sp>
+        <p:nvSpPr>
+          <p:cNvPr id="4" name="Номер слайда 3"/>
+          <p:cNvSpPr>
+            <a:spLocks noGrp="1"/>
+          </p:cNvSpPr>
+          <p:nvPr>
+            <p:ph type="sldNum" sz="quarter" idx="10"/>
+          </p:nvPr>
+        </p:nvSpPr>
+        <p:spPr/>
+        <p:txBody>
+          <a:bodyPr/>
+          <a:lstStyle/>
+          <a:p>
+            <a:pPr marL="0" marR="0" lvl="0" indent="0" algn="r" defTabSz="914400" rtl="0" eaLnBrk="1" fontAlgn="auto" latinLnBrk="0" hangingPunct="1">
+              <a:lnSpc>
+                <a:spcPct val="100000"/>
+              </a:lnSpc>
+              <a:spcBef>
+                <a:spcPts val="0"/>
+              </a:spcBef>
+              <a:spcAft>
+                <a:spcPts val="0"/>
+              </a:spcAft>
+              <a:buClrTx/>
+              <a:buSzTx/>
+              <a:buFontTx/>
+              <a:buNone/>
+              <a:tabLst/>
+              <a:defRPr/>
+            </a:pPr>
+            <a:fld id="{622F1C9E-D65E-417E-9FEF-9AD7ACC20294}" type="slidenum">
+              <a:rPr kumimoji="0" lang="ru-RU" sz="1200" b="0" i="0" u="none" strike="noStrike" kern="1200" cap="none" spc="0" normalizeH="0" baseline="0" noProof="0" smtClean="0">
+                <a:ln>
+                  <a:noFill/>
+                </a:ln>
+                <a:solidFill>
+                  <a:prstClr val="black"/>
+                </a:solidFill>
+                <a:effectLst/>
+                <a:uLnTx/>
+                <a:uFillTx/>
+                <a:latin typeface="Calibri" panose="020F0502020204030204"/>
+                <a:ea typeface="+mn-ea"/>
+                <a:cs typeface="+mn-cs"/>
+              </a:rPr>
+              <a:pPr marL="0" marR="0" lvl="0" indent="0" algn="r" defTabSz="914400" rtl="0" eaLnBrk="1" fontAlgn="auto" latinLnBrk="0" hangingPunct="1">
+                <a:lnSpc>
+                  <a:spcPct val="100000"/>
+                </a:lnSpc>
+                <a:spcBef>
+                  <a:spcPts val="0"/>
+                </a:spcBef>
+                <a:spcAft>
+                  <a:spcPts val="0"/>
+                </a:spcAft>
+                <a:buClrTx/>
+                <a:buSzTx/>
+                <a:buFontTx/>
+                <a:buNone/>
+                <a:tabLst/>
+                <a:defRPr/>
+              </a:pPr>
+              <a:t>131</a:t>
+            </a:fld>
+            <a:endParaRPr kumimoji="0" lang="ru-RU" sz="1200" b="0" i="0" u="none" strike="noStrike" kern="1200" cap="none" spc="0" normalizeH="0" baseline="0" noProof="0">
+              <a:ln>
+                <a:noFill/>
+              </a:ln>
+              <a:solidFill>
+                <a:prstClr val="black"/>
+              </a:solidFill>
+              <a:effectLst/>
+              <a:uLnTx/>
+              <a:uFillTx/>
+              <a:latin typeface="Calibri" panose="020F0502020204030204"/>
+              <a:ea typeface="+mn-ea"/>
+              <a:cs typeface="+mn-cs"/>
+            </a:endParaRPr>
+          </a:p>
+        </p:txBody>
+      </p:sp>
+    </p:spTree>
+    <p:extLst>
+      <p:ext uri="{BB962C8B-B14F-4D97-AF65-F5344CB8AC3E}">
+        <p14:creationId xmlns:p14="http://schemas.microsoft.com/office/powerpoint/2010/main" val="2686253329"/>
+      </p:ext>
+    </p:extLst>
+  </p:cSld>
+  <p:clrMapOvr>
+    <a:masterClrMapping/>
+  </p:clrMapOvr>
+</p:notes>
+</file>
+
+<file path=ppt/notesSlides/notesSlide72.xml><?xml version="1.0" encoding="utf-8"?>
+<p:notes xmlns:a="http://schemas.openxmlformats.org/drawingml/2006/main" xmlns:r="http://schemas.openxmlformats.org/officeDocument/2006/relationships" xmlns:p="http://schemas.openxmlformats.org/presentationml/2006/main">
+  <p:cSld>
+    <p:spTree>
+      <p:nvGrpSpPr>
+        <p:cNvPr id="1" name=""/>
+        <p:cNvGrpSpPr/>
+        <p:nvPr/>
+      </p:nvGrpSpPr>
+      <p:grpSpPr>
+        <a:xfrm>
+          <a:off x="0" y="0"/>
+          <a:ext cx="0" cy="0"/>
+          <a:chOff x="0" y="0"/>
+          <a:chExt cx="0" cy="0"/>
+        </a:xfrm>
+      </p:grpSpPr>
+      <p:sp>
+        <p:nvSpPr>
+          <p:cNvPr id="2" name="Образ слайда 1"/>
+          <p:cNvSpPr>
+            <a:spLocks noGrp="1" noRot="1" noChangeAspect="1"/>
+          </p:cNvSpPr>
+          <p:nvPr>
+            <p:ph type="sldImg"/>
+          </p:nvPr>
+        </p:nvSpPr>
+        <p:spPr/>
+      </p:sp>
+      <p:sp>
+        <p:nvSpPr>
+          <p:cNvPr id="3" name="Заметки 2"/>
+          <p:cNvSpPr>
+            <a:spLocks noGrp="1"/>
+          </p:cNvSpPr>
+          <p:nvPr>
+            <p:ph type="body" idx="1"/>
+          </p:nvPr>
+        </p:nvSpPr>
+        <p:spPr/>
+        <p:txBody>
+          <a:bodyPr/>
+          <a:lstStyle/>
+          <a:p>
+            <a:pPr rtl="0" fontAlgn="base"/>
+            <a:r>
+              <a:rPr lang="ru-RU" sz="1200" b="0" i="0" kern="1200" dirty="0" smtClean="0">
+                <a:solidFill>
+                  <a:schemeClr val="tx1"/>
+                </a:solidFill>
+                <a:effectLst/>
+                <a:latin typeface="+mn-lt"/>
+                <a:ea typeface="+mn-ea"/>
+                <a:cs typeface="+mn-cs"/>
+              </a:rPr>
+              <a:t>Нас наводит на мысль о некоторой возможности</a:t>
+            </a:r>
+            <a:r>
+              <a:rPr lang="ru-RU" sz="1200" b="0" i="0" kern="1200" baseline="0" dirty="0" smtClean="0">
+                <a:solidFill>
+                  <a:schemeClr val="tx1"/>
+                </a:solidFill>
+                <a:effectLst/>
+                <a:latin typeface="+mn-lt"/>
+                <a:ea typeface="+mn-ea"/>
+                <a:cs typeface="+mn-cs"/>
+              </a:rPr>
+              <a:t> (функции)</a:t>
+            </a:r>
+            <a:endParaRPr lang="ru-RU" sz="1200" b="0" i="0" kern="1200" dirty="0" smtClean="0">
+              <a:solidFill>
+                <a:schemeClr val="tx1"/>
+              </a:solidFill>
+              <a:effectLst/>
+              <a:latin typeface="+mn-lt"/>
+              <a:ea typeface="+mn-ea"/>
+              <a:cs typeface="+mn-cs"/>
+            </a:endParaRPr>
+          </a:p>
+        </p:txBody>
+      </p:sp>
+      <p:sp>
+        <p:nvSpPr>
+          <p:cNvPr id="4" name="Номер слайда 3"/>
+          <p:cNvSpPr>
+            <a:spLocks noGrp="1"/>
+          </p:cNvSpPr>
+          <p:nvPr>
+            <p:ph type="sldNum" sz="quarter" idx="10"/>
+          </p:nvPr>
+        </p:nvSpPr>
+        <p:spPr/>
+        <p:txBody>
+          <a:bodyPr/>
+          <a:lstStyle/>
+          <a:p>
+            <a:pPr marL="0" marR="0" lvl="0" indent="0" algn="r" defTabSz="914400" rtl="0" eaLnBrk="1" fontAlgn="auto" latinLnBrk="0" hangingPunct="1">
+              <a:lnSpc>
+                <a:spcPct val="100000"/>
+              </a:lnSpc>
+              <a:spcBef>
+                <a:spcPts val="0"/>
+              </a:spcBef>
+              <a:spcAft>
+                <a:spcPts val="0"/>
+              </a:spcAft>
+              <a:buClrTx/>
+              <a:buSzTx/>
+              <a:buFontTx/>
+              <a:buNone/>
+              <a:tabLst/>
+              <a:defRPr/>
+            </a:pPr>
+            <a:fld id="{622F1C9E-D65E-417E-9FEF-9AD7ACC20294}" type="slidenum">
+              <a:rPr kumimoji="0" lang="ru-RU" sz="1200" b="0" i="0" u="none" strike="noStrike" kern="1200" cap="none" spc="0" normalizeH="0" baseline="0" noProof="0" smtClean="0">
+                <a:ln>
+                  <a:noFill/>
+                </a:ln>
+                <a:solidFill>
+                  <a:prstClr val="black"/>
+                </a:solidFill>
+                <a:effectLst/>
+                <a:uLnTx/>
+                <a:uFillTx/>
+                <a:latin typeface="Calibri" panose="020F0502020204030204"/>
+                <a:ea typeface="+mn-ea"/>
+                <a:cs typeface="+mn-cs"/>
+              </a:rPr>
+              <a:pPr marL="0" marR="0" lvl="0" indent="0" algn="r" defTabSz="914400" rtl="0" eaLnBrk="1" fontAlgn="auto" latinLnBrk="0" hangingPunct="1">
+                <a:lnSpc>
+                  <a:spcPct val="100000"/>
+                </a:lnSpc>
+                <a:spcBef>
+                  <a:spcPts val="0"/>
+                </a:spcBef>
+                <a:spcAft>
+                  <a:spcPts val="0"/>
+                </a:spcAft>
+                <a:buClrTx/>
+                <a:buSzTx/>
+                <a:buFontTx/>
+                <a:buNone/>
+                <a:tabLst/>
+                <a:defRPr/>
+              </a:pPr>
+              <a:t>132</a:t>
+            </a:fld>
+            <a:endParaRPr kumimoji="0" lang="ru-RU" sz="1200" b="0" i="0" u="none" strike="noStrike" kern="1200" cap="none" spc="0" normalizeH="0" baseline="0" noProof="0">
+              <a:ln>
+                <a:noFill/>
+              </a:ln>
+              <a:solidFill>
+                <a:prstClr val="black"/>
+              </a:solidFill>
+              <a:effectLst/>
+              <a:uLnTx/>
+              <a:uFillTx/>
+              <a:latin typeface="Calibri" panose="020F0502020204030204"/>
+              <a:ea typeface="+mn-ea"/>
+              <a:cs typeface="+mn-cs"/>
+            </a:endParaRPr>
+          </a:p>
+        </p:txBody>
+      </p:sp>
+    </p:spTree>
+    <p:extLst>
+      <p:ext uri="{BB962C8B-B14F-4D97-AF65-F5344CB8AC3E}">
+        <p14:creationId xmlns:p14="http://schemas.microsoft.com/office/powerpoint/2010/main" val="692123416"/>
       </p:ext>
     </p:extLst>
   </p:cSld>
@@ -19205,7 +20037,7 @@
           <a:p>
             <a:fld id="{F2FFB779-270B-4192-84BA-A697F48306DC}" type="datetimeFigureOut">
               <a:rPr lang="ru-RU" smtClean="0"/>
-              <a:t>21.07.2020</a:t>
+              <a:t>23.07.2020</a:t>
             </a:fld>
             <a:endParaRPr lang="ru-RU"/>
           </a:p>
@@ -19373,7 +20205,7 @@
           <a:p>
             <a:fld id="{F2FFB779-270B-4192-84BA-A697F48306DC}" type="datetimeFigureOut">
               <a:rPr lang="ru-RU" smtClean="0"/>
-              <a:t>21.07.2020</a:t>
+              <a:t>23.07.2020</a:t>
             </a:fld>
             <a:endParaRPr lang="ru-RU"/>
           </a:p>
@@ -19551,7 +20383,7 @@
           <a:p>
             <a:fld id="{F2FFB779-270B-4192-84BA-A697F48306DC}" type="datetimeFigureOut">
               <a:rPr lang="ru-RU" smtClean="0"/>
-              <a:t>21.07.2020</a:t>
+              <a:t>23.07.2020</a:t>
             </a:fld>
             <a:endParaRPr lang="ru-RU"/>
           </a:p>
@@ -19719,7 +20551,7 @@
           <a:p>
             <a:fld id="{F2FFB779-270B-4192-84BA-A697F48306DC}" type="datetimeFigureOut">
               <a:rPr lang="ru-RU" smtClean="0"/>
-              <a:t>21.07.2020</a:t>
+              <a:t>23.07.2020</a:t>
             </a:fld>
             <a:endParaRPr lang="ru-RU"/>
           </a:p>
@@ -19964,7 +20796,7 @@
           <a:p>
             <a:fld id="{F2FFB779-270B-4192-84BA-A697F48306DC}" type="datetimeFigureOut">
               <a:rPr lang="ru-RU" smtClean="0"/>
-              <a:t>21.07.2020</a:t>
+              <a:t>23.07.2020</a:t>
             </a:fld>
             <a:endParaRPr lang="ru-RU"/>
           </a:p>
@@ -20193,7 +21025,7 @@
           <a:p>
             <a:fld id="{F2FFB779-270B-4192-84BA-A697F48306DC}" type="datetimeFigureOut">
               <a:rPr lang="ru-RU" smtClean="0"/>
-              <a:t>21.07.2020</a:t>
+              <a:t>23.07.2020</a:t>
             </a:fld>
             <a:endParaRPr lang="ru-RU"/>
           </a:p>
@@ -20557,7 +21389,7 @@
           <a:p>
             <a:fld id="{F2FFB779-270B-4192-84BA-A697F48306DC}" type="datetimeFigureOut">
               <a:rPr lang="ru-RU" smtClean="0"/>
-              <a:t>21.07.2020</a:t>
+              <a:t>23.07.2020</a:t>
             </a:fld>
             <a:endParaRPr lang="ru-RU"/>
           </a:p>
@@ -20674,7 +21506,7 @@
           <a:p>
             <a:fld id="{F2FFB779-270B-4192-84BA-A697F48306DC}" type="datetimeFigureOut">
               <a:rPr lang="ru-RU" smtClean="0"/>
-              <a:t>21.07.2020</a:t>
+              <a:t>23.07.2020</a:t>
             </a:fld>
             <a:endParaRPr lang="ru-RU"/>
           </a:p>
@@ -20769,7 +21601,7 @@
           <a:p>
             <a:fld id="{F2FFB779-270B-4192-84BA-A697F48306DC}" type="datetimeFigureOut">
               <a:rPr lang="ru-RU" smtClean="0"/>
-              <a:t>21.07.2020</a:t>
+              <a:t>23.07.2020</a:t>
             </a:fld>
             <a:endParaRPr lang="ru-RU"/>
           </a:p>
@@ -21044,7 +21876,7 @@
           <a:p>
             <a:fld id="{F2FFB779-270B-4192-84BA-A697F48306DC}" type="datetimeFigureOut">
               <a:rPr lang="ru-RU" smtClean="0"/>
-              <a:t>21.07.2020</a:t>
+              <a:t>23.07.2020</a:t>
             </a:fld>
             <a:endParaRPr lang="ru-RU"/>
           </a:p>
@@ -21296,7 +22128,7 @@
           <a:p>
             <a:fld id="{F2FFB779-270B-4192-84BA-A697F48306DC}" type="datetimeFigureOut">
               <a:rPr lang="ru-RU" smtClean="0"/>
-              <a:t>21.07.2020</a:t>
+              <a:t>23.07.2020</a:t>
             </a:fld>
             <a:endParaRPr lang="ru-RU"/>
           </a:p>
@@ -21507,7 +22339,7 @@
           <a:p>
             <a:fld id="{F2FFB779-270B-4192-84BA-A697F48306DC}" type="datetimeFigureOut">
               <a:rPr lang="ru-RU" smtClean="0"/>
-              <a:t>21.07.2020</a:t>
+              <a:t>23.07.2020</a:t>
             </a:fld>
             <a:endParaRPr lang="ru-RU"/>
           </a:p>
@@ -26885,6 +27717,172 @@
 </p:sld>
 </file>
 
+<file path=ppt/slides/slide129.xml><?xml version="1.0" encoding="utf-8"?>
+<p:sld xmlns:a="http://schemas.openxmlformats.org/drawingml/2006/main" xmlns:r="http://schemas.openxmlformats.org/officeDocument/2006/relationships" xmlns:p="http://schemas.openxmlformats.org/presentationml/2006/main">
+  <p:cSld>
+    <p:bg>
+      <p:bgPr>
+        <a:solidFill>
+          <a:srgbClr val="262626"/>
+        </a:solidFill>
+        <a:effectLst/>
+      </p:bgPr>
+    </p:bg>
+    <p:spTree>
+      <p:nvGrpSpPr>
+        <p:cNvPr id="1" name=""/>
+        <p:cNvGrpSpPr/>
+        <p:nvPr/>
+      </p:nvGrpSpPr>
+      <p:grpSpPr>
+        <a:xfrm>
+          <a:off x="0" y="0"/>
+          <a:ext cx="0" cy="0"/>
+          <a:chOff x="0" y="0"/>
+          <a:chExt cx="0" cy="0"/>
+        </a:xfrm>
+      </p:grpSpPr>
+      <p:pic>
+        <p:nvPicPr>
+          <p:cNvPr id="3" name="Рисунок 2" descr="Изображение выглядит как рисунок&#10;&#10;Автоматически созданное описание">
+            <a:extLst>
+              <a:ext uri="{FF2B5EF4-FFF2-40B4-BE49-F238E27FC236}">
+                <a16:creationId xmlns:a16="http://schemas.microsoft.com/office/drawing/2014/main" id="{4EAD6ACE-3298-4D74-B944-64C6FF04E9A0}"/>
+              </a:ext>
+            </a:extLst>
+          </p:cNvPr>
+          <p:cNvPicPr>
+            <a:picLocks noChangeAspect="1"/>
+          </p:cNvPicPr>
+          <p:nvPr/>
+        </p:nvPicPr>
+        <p:blipFill>
+          <a:blip r:embed="rId3"/>
+          <a:stretch>
+            <a:fillRect/>
+          </a:stretch>
+        </p:blipFill>
+        <p:spPr>
+          <a:xfrm>
+            <a:off x="2625629" y="2142972"/>
+            <a:ext cx="2403570" cy="2403570"/>
+          </a:xfrm>
+          <a:prstGeom prst="rect">
+            <a:avLst/>
+          </a:prstGeom>
+        </p:spPr>
+      </p:pic>
+      <p:sp>
+        <p:nvSpPr>
+          <p:cNvPr id="8" name="Прямоугольник 7"/>
+          <p:cNvSpPr/>
+          <p:nvPr/>
+        </p:nvSpPr>
+        <p:spPr>
+          <a:xfrm>
+            <a:off x="5725757" y="2990814"/>
+            <a:ext cx="3288081" cy="707886"/>
+          </a:xfrm>
+          <a:prstGeom prst="rect">
+            <a:avLst/>
+          </a:prstGeom>
+        </p:spPr>
+        <p:txBody>
+          <a:bodyPr wrap="none">
+            <a:spAutoFit/>
+          </a:bodyPr>
+          <a:lstStyle/>
+          <a:p>
+            <a:pPr lvl="0" algn="ctr">
+              <a:defRPr/>
+            </a:pPr>
+            <a:r>
+              <a:rPr lang="en-US" sz="4000" dirty="0" smtClean="0">
+                <a:solidFill>
+                  <a:srgbClr val="BF4141"/>
+                </a:solidFill>
+                <a:latin typeface="Consolas"/>
+                <a:cs typeface="Calibri"/>
+              </a:rPr>
+              <a:t>is</a:t>
+            </a:r>
+            <a:r>
+              <a:rPr lang="en-US" sz="4000" dirty="0" smtClean="0">
+                <a:solidFill>
+                  <a:srgbClr val="00D8FF"/>
+                </a:solidFill>
+                <a:latin typeface="Consolas"/>
+                <a:cs typeface="Calibri"/>
+              </a:rPr>
+              <a:t> flexible</a:t>
+            </a:r>
+            <a:endParaRPr kumimoji="0" lang="en-US" sz="4000" b="0" i="0" u="none" strike="noStrike" kern="1200" cap="none" spc="0" normalizeH="0" baseline="0" noProof="0" dirty="0">
+              <a:ln>
+                <a:noFill/>
+              </a:ln>
+              <a:solidFill>
+                <a:srgbClr val="00D8FF"/>
+              </a:solidFill>
+              <a:effectLst/>
+              <a:uLnTx/>
+              <a:uFillTx/>
+              <a:latin typeface="Consolas"/>
+              <a:ea typeface="+mn-ea"/>
+              <a:cs typeface="Calibri"/>
+            </a:endParaRPr>
+          </a:p>
+        </p:txBody>
+      </p:sp>
+      <p:pic>
+        <p:nvPicPr>
+          <p:cNvPr id="9" name="Рисунок 2" descr="Изображение выглядит как знак&#10;&#10;Автоматически созданное описание">
+            <a:extLst>
+              <a:ext uri="{FF2B5EF4-FFF2-40B4-BE49-F238E27FC236}">
+                <a16:creationId xmlns:a16="http://schemas.microsoft.com/office/drawing/2014/main" id="{94CE257F-A4AB-4D99-8638-F51E066F3AF6}"/>
+              </a:ext>
+            </a:extLst>
+          </p:cNvPr>
+          <p:cNvPicPr>
+            <a:picLocks noChangeAspect="1"/>
+          </p:cNvPicPr>
+          <p:nvPr/>
+        </p:nvPicPr>
+        <p:blipFill>
+          <a:blip r:embed="rId4"/>
+          <a:stretch>
+            <a:fillRect/>
+          </a:stretch>
+        </p:blipFill>
+        <p:spPr>
+          <a:xfrm>
+            <a:off x="4401266" y="2142972"/>
+            <a:ext cx="2403570" cy="2403570"/>
+          </a:xfrm>
+          <a:prstGeom prst="rect">
+            <a:avLst/>
+          </a:prstGeom>
+        </p:spPr>
+      </p:pic>
+    </p:spTree>
+    <p:extLst>
+      <p:ext uri="{BB962C8B-B14F-4D97-AF65-F5344CB8AC3E}">
+        <p14:creationId xmlns:p14="http://schemas.microsoft.com/office/powerpoint/2010/main" val="2509957878"/>
+      </p:ext>
+    </p:extLst>
+  </p:cSld>
+  <p:clrMapOvr>
+    <a:masterClrMapping/>
+  </p:clrMapOvr>
+  <p:timing>
+    <p:tnLst>
+      <p:par>
+        <p:cTn id="1" dur="indefinite" restart="never" nodeType="tmRoot"/>
+      </p:par>
+    </p:tnLst>
+  </p:timing>
+</p:sld>
+</file>
+
 <file path=ppt/slides/slide13.xml><?xml version="1.0" encoding="utf-8"?>
 <p:sld xmlns:a="http://schemas.openxmlformats.org/drawingml/2006/main" xmlns:r="http://schemas.openxmlformats.org/officeDocument/2006/relationships" xmlns:p="http://schemas.openxmlformats.org/presentationml/2006/main">
   <p:cSld>
@@ -26950,6 +27948,1153 @@
   <p:clrMapOvr>
     <a:masterClrMapping/>
   </p:clrMapOvr>
+</p:sld>
+</file>
+
+<file path=ppt/slides/slide130.xml><?xml version="1.0" encoding="utf-8"?>
+<p:sld xmlns:a="http://schemas.openxmlformats.org/drawingml/2006/main" xmlns:r="http://schemas.openxmlformats.org/officeDocument/2006/relationships" xmlns:p="http://schemas.openxmlformats.org/presentationml/2006/main">
+  <p:cSld>
+    <p:bg>
+      <p:bgPr>
+        <a:solidFill>
+          <a:srgbClr val="262626"/>
+        </a:solidFill>
+        <a:effectLst/>
+      </p:bgPr>
+    </p:bg>
+    <p:spTree>
+      <p:nvGrpSpPr>
+        <p:cNvPr id="1" name=""/>
+        <p:cNvGrpSpPr/>
+        <p:nvPr/>
+      </p:nvGrpSpPr>
+      <p:grpSpPr>
+        <a:xfrm>
+          <a:off x="0" y="0"/>
+          <a:ext cx="0" cy="0"/>
+          <a:chOff x="0" y="0"/>
+          <a:chExt cx="0" cy="0"/>
+        </a:xfrm>
+      </p:grpSpPr>
+      <p:sp>
+        <p:nvSpPr>
+          <p:cNvPr id="8" name="Прямоугольник 7"/>
+          <p:cNvSpPr/>
+          <p:nvPr/>
+        </p:nvSpPr>
+        <p:spPr>
+          <a:xfrm>
+            <a:off x="2918640" y="3084977"/>
+            <a:ext cx="3005951" cy="707886"/>
+          </a:xfrm>
+          <a:prstGeom prst="rect">
+            <a:avLst/>
+          </a:prstGeom>
+        </p:spPr>
+        <p:txBody>
+          <a:bodyPr wrap="none">
+            <a:spAutoFit/>
+          </a:bodyPr>
+          <a:lstStyle/>
+          <a:p>
+            <a:pPr marL="0" marR="0" lvl="0" indent="0" algn="ctr" defTabSz="914400" rtl="0" eaLnBrk="1" fontAlgn="auto" latinLnBrk="0" hangingPunct="1">
+              <a:lnSpc>
+                <a:spcPct val="100000"/>
+              </a:lnSpc>
+              <a:spcBef>
+                <a:spcPts val="0"/>
+              </a:spcBef>
+              <a:spcAft>
+                <a:spcPts val="0"/>
+              </a:spcAft>
+              <a:buClrTx/>
+              <a:buSzTx/>
+              <a:buFontTx/>
+              <a:buNone/>
+              <a:tabLst/>
+              <a:defRPr/>
+            </a:pPr>
+            <a:r>
+              <a:rPr lang="en-US" sz="4000" noProof="0" dirty="0" smtClean="0">
+                <a:solidFill>
+                  <a:srgbClr val="00D8FF"/>
+                </a:solidFill>
+                <a:latin typeface="Consolas"/>
+                <a:cs typeface="Calibri"/>
+              </a:rPr>
+              <a:t>What about</a:t>
+            </a:r>
+            <a:endParaRPr kumimoji="0" lang="en-US" sz="4000" b="0" i="0" u="none" strike="noStrike" kern="1200" cap="none" spc="0" normalizeH="0" baseline="0" noProof="0" dirty="0">
+              <a:ln>
+                <a:noFill/>
+              </a:ln>
+              <a:solidFill>
+                <a:srgbClr val="00D8FF"/>
+              </a:solidFill>
+              <a:effectLst/>
+              <a:uLnTx/>
+              <a:uFillTx/>
+              <a:latin typeface="Consolas"/>
+              <a:ea typeface="+mn-ea"/>
+              <a:cs typeface="Calibri"/>
+            </a:endParaRPr>
+          </a:p>
+        </p:txBody>
+      </p:sp>
+      <p:pic>
+        <p:nvPicPr>
+          <p:cNvPr id="9" name="Рисунок 2" descr="Изображение выглядит как знак&#10;&#10;Автоматически созданное описание">
+            <a:extLst>
+              <a:ext uri="{FF2B5EF4-FFF2-40B4-BE49-F238E27FC236}">
+                <a16:creationId xmlns:a16="http://schemas.microsoft.com/office/drawing/2014/main" id="{94CE257F-A4AB-4D99-8638-F51E066F3AF6}"/>
+              </a:ext>
+            </a:extLst>
+          </p:cNvPr>
+          <p:cNvPicPr>
+            <a:picLocks noChangeAspect="1"/>
+          </p:cNvPicPr>
+          <p:nvPr/>
+        </p:nvPicPr>
+        <p:blipFill>
+          <a:blip r:embed="rId3"/>
+          <a:stretch>
+            <a:fillRect/>
+          </a:stretch>
+        </p:blipFill>
+        <p:spPr>
+          <a:xfrm>
+            <a:off x="6190406" y="2038080"/>
+            <a:ext cx="2519094" cy="2519094"/>
+          </a:xfrm>
+          <a:prstGeom prst="rect">
+            <a:avLst/>
+          </a:prstGeom>
+        </p:spPr>
+      </p:pic>
+      <p:sp>
+        <p:nvSpPr>
+          <p:cNvPr id="5" name="Прямоугольник 4"/>
+          <p:cNvSpPr/>
+          <p:nvPr/>
+        </p:nvSpPr>
+        <p:spPr>
+          <a:xfrm>
+            <a:off x="8975315" y="3084977"/>
+            <a:ext cx="466794" cy="707886"/>
+          </a:xfrm>
+          <a:prstGeom prst="rect">
+            <a:avLst/>
+          </a:prstGeom>
+        </p:spPr>
+        <p:txBody>
+          <a:bodyPr wrap="none">
+            <a:spAutoFit/>
+          </a:bodyPr>
+          <a:lstStyle/>
+          <a:p>
+            <a:pPr marL="0" marR="0" lvl="0" indent="0" algn="ctr" defTabSz="914400" rtl="0" eaLnBrk="1" fontAlgn="auto" latinLnBrk="0" hangingPunct="1">
+              <a:lnSpc>
+                <a:spcPct val="100000"/>
+              </a:lnSpc>
+              <a:spcBef>
+                <a:spcPts val="0"/>
+              </a:spcBef>
+              <a:spcAft>
+                <a:spcPts val="0"/>
+              </a:spcAft>
+              <a:buClrTx/>
+              <a:buSzTx/>
+              <a:buFontTx/>
+              <a:buNone/>
+              <a:tabLst/>
+              <a:defRPr/>
+            </a:pPr>
+            <a:r>
+              <a:rPr lang="en-US" sz="4000" noProof="0" dirty="0" smtClean="0">
+                <a:solidFill>
+                  <a:srgbClr val="00D8FF"/>
+                </a:solidFill>
+                <a:latin typeface="Consolas"/>
+                <a:cs typeface="Calibri"/>
+              </a:rPr>
+              <a:t>?</a:t>
+            </a:r>
+            <a:endParaRPr kumimoji="0" lang="en-US" sz="4000" b="0" i="0" u="none" strike="noStrike" kern="1200" cap="none" spc="0" normalizeH="0" baseline="0" noProof="0" dirty="0">
+              <a:ln>
+                <a:noFill/>
+              </a:ln>
+              <a:solidFill>
+                <a:srgbClr val="00D8FF"/>
+              </a:solidFill>
+              <a:effectLst/>
+              <a:uLnTx/>
+              <a:uFillTx/>
+              <a:latin typeface="Consolas"/>
+              <a:ea typeface="+mn-ea"/>
+              <a:cs typeface="Calibri"/>
+            </a:endParaRPr>
+          </a:p>
+        </p:txBody>
+      </p:sp>
+    </p:spTree>
+    <p:extLst>
+      <p:ext uri="{BB962C8B-B14F-4D97-AF65-F5344CB8AC3E}">
+        <p14:creationId xmlns:p14="http://schemas.microsoft.com/office/powerpoint/2010/main" val="2247932078"/>
+      </p:ext>
+    </p:extLst>
+  </p:cSld>
+  <p:clrMapOvr>
+    <a:masterClrMapping/>
+  </p:clrMapOvr>
+  <p:timing>
+    <p:tnLst>
+      <p:par>
+        <p:cTn id="1" dur="indefinite" restart="never" nodeType="tmRoot"/>
+      </p:par>
+    </p:tnLst>
+  </p:timing>
+</p:sld>
+</file>
+
+<file path=ppt/slides/slide131.xml><?xml version="1.0" encoding="utf-8"?>
+<p:sld xmlns:a="http://schemas.openxmlformats.org/drawingml/2006/main" xmlns:r="http://schemas.openxmlformats.org/officeDocument/2006/relationships" xmlns:p="http://schemas.openxmlformats.org/presentationml/2006/main">
+  <p:cSld>
+    <p:bg>
+      <p:bgPr>
+        <a:solidFill>
+          <a:srgbClr val="262626"/>
+        </a:solidFill>
+        <a:effectLst/>
+      </p:bgPr>
+    </p:bg>
+    <p:spTree>
+      <p:nvGrpSpPr>
+        <p:cNvPr id="1" name=""/>
+        <p:cNvGrpSpPr/>
+        <p:nvPr/>
+      </p:nvGrpSpPr>
+      <p:grpSpPr>
+        <a:xfrm>
+          <a:off x="0" y="0"/>
+          <a:ext cx="0" cy="0"/>
+          <a:chOff x="0" y="0"/>
+          <a:chExt cx="0" cy="0"/>
+        </a:xfrm>
+      </p:grpSpPr>
+      <p:sp>
+        <p:nvSpPr>
+          <p:cNvPr id="6" name="Прямоугольник 5"/>
+          <p:cNvSpPr/>
+          <p:nvPr/>
+        </p:nvSpPr>
+        <p:spPr>
+          <a:xfrm>
+            <a:off x="2040355" y="2958532"/>
+            <a:ext cx="8331127" cy="630942"/>
+          </a:xfrm>
+          <a:prstGeom prst="rect">
+            <a:avLst/>
+          </a:prstGeom>
+        </p:spPr>
+        <p:txBody>
+          <a:bodyPr wrap="none">
+            <a:spAutoFit/>
+          </a:bodyPr>
+          <a:lstStyle/>
+          <a:p>
+            <a:r>
+              <a:rPr lang="en-US" sz="3500" dirty="0" err="1" smtClean="0">
+                <a:solidFill>
+                  <a:srgbClr val="00D8FF"/>
+                </a:solidFill>
+                <a:latin typeface="Consolas"/>
+                <a:cs typeface="Calibri"/>
+              </a:rPr>
+              <a:t>createAnimal</a:t>
+            </a:r>
+            <a:r>
+              <a:rPr lang="en-US" sz="3500" dirty="0" smtClean="0">
+                <a:solidFill>
+                  <a:srgbClr val="00D8FF"/>
+                </a:solidFill>
+                <a:latin typeface="Consolas"/>
+                <a:cs typeface="Calibri"/>
+              </a:rPr>
+              <a:t>(defaults</a:t>
+            </a:r>
+            <a:r>
+              <a:rPr lang="en-US" sz="3500" dirty="0" smtClean="0">
+                <a:solidFill>
+                  <a:srgbClr val="BF4141"/>
+                </a:solidFill>
+                <a:latin typeface="Consolas"/>
+                <a:cs typeface="Calibri"/>
+              </a:rPr>
+              <a:t>: ?</a:t>
+            </a:r>
+            <a:r>
+              <a:rPr lang="en-US" sz="3500" dirty="0" smtClean="0">
+                <a:solidFill>
+                  <a:srgbClr val="00D8FF"/>
+                </a:solidFill>
+                <a:latin typeface="Consolas"/>
+                <a:cs typeface="Calibri"/>
+              </a:rPr>
+              <a:t>): Animal</a:t>
+            </a:r>
+            <a:endParaRPr lang="en-US" sz="3500" dirty="0">
+              <a:solidFill>
+                <a:srgbClr val="00D8FF"/>
+              </a:solidFill>
+            </a:endParaRPr>
+          </a:p>
+        </p:txBody>
+      </p:sp>
+      <p:sp>
+        <p:nvSpPr>
+          <p:cNvPr id="10" name="Прямоугольник 9"/>
+          <p:cNvSpPr/>
+          <p:nvPr/>
+        </p:nvSpPr>
+        <p:spPr>
+          <a:xfrm>
+            <a:off x="4164144" y="2196785"/>
+            <a:ext cx="3887603" cy="2785378"/>
+          </a:xfrm>
+          <a:prstGeom prst="rect">
+            <a:avLst/>
+          </a:prstGeom>
+        </p:spPr>
+        <p:txBody>
+          <a:bodyPr wrap="none">
+            <a:spAutoFit/>
+          </a:bodyPr>
+          <a:lstStyle/>
+          <a:p>
+            <a:r>
+              <a:rPr lang="en-US" sz="3500" dirty="0" smtClean="0">
+                <a:solidFill>
+                  <a:srgbClr val="00D8FF"/>
+                </a:solidFill>
+                <a:latin typeface="Consolas"/>
+                <a:cs typeface="Calibri"/>
+              </a:rPr>
+              <a:t>type </a:t>
+            </a:r>
+            <a:r>
+              <a:rPr lang="en-US" sz="3500" dirty="0" smtClean="0">
+                <a:solidFill>
+                  <a:srgbClr val="BF4141"/>
+                </a:solidFill>
+                <a:latin typeface="Consolas"/>
+                <a:cs typeface="Calibri"/>
+              </a:rPr>
+              <a:t>Animal</a:t>
+            </a:r>
+            <a:r>
+              <a:rPr lang="en-US" sz="3500" dirty="0" smtClean="0">
+                <a:solidFill>
+                  <a:srgbClr val="00D8FF"/>
+                </a:solidFill>
+                <a:latin typeface="Consolas"/>
+                <a:cs typeface="Calibri"/>
+              </a:rPr>
+              <a:t> = {</a:t>
+            </a:r>
+            <a:endParaRPr lang="en-US" sz="3500" dirty="0" smtClean="0">
+              <a:solidFill>
+                <a:srgbClr val="00D8FF"/>
+              </a:solidFill>
+              <a:latin typeface="Consolas"/>
+              <a:cs typeface="Calibri"/>
+            </a:endParaRPr>
+          </a:p>
+          <a:p>
+            <a:r>
+              <a:rPr lang="en-US" sz="3500" dirty="0">
+                <a:solidFill>
+                  <a:srgbClr val="00D8FF"/>
+                </a:solidFill>
+                <a:latin typeface="Consolas"/>
+                <a:cs typeface="Calibri"/>
+              </a:rPr>
+              <a:t> </a:t>
+            </a:r>
+            <a:r>
+              <a:rPr lang="en-US" sz="3500" dirty="0" smtClean="0">
+                <a:solidFill>
+                  <a:srgbClr val="00D8FF"/>
+                </a:solidFill>
+                <a:latin typeface="Consolas"/>
+                <a:cs typeface="Calibri"/>
+              </a:rPr>
+              <a:t> name: </a:t>
+            </a:r>
+            <a:r>
+              <a:rPr lang="en-US" sz="3500" dirty="0" smtClean="0">
+                <a:solidFill>
+                  <a:srgbClr val="00D8FF"/>
+                </a:solidFill>
+                <a:latin typeface="Consolas"/>
+                <a:cs typeface="Calibri"/>
+              </a:rPr>
+              <a:t>string;</a:t>
+            </a:r>
+            <a:endParaRPr lang="en-US" sz="3500" dirty="0" smtClean="0">
+              <a:solidFill>
+                <a:srgbClr val="00D8FF"/>
+              </a:solidFill>
+              <a:latin typeface="Consolas"/>
+              <a:cs typeface="Calibri"/>
+            </a:endParaRPr>
+          </a:p>
+          <a:p>
+            <a:r>
+              <a:rPr lang="en-US" sz="3500" dirty="0">
+                <a:solidFill>
+                  <a:srgbClr val="00D8FF"/>
+                </a:solidFill>
+                <a:latin typeface="Consolas"/>
+                <a:cs typeface="Calibri"/>
+              </a:rPr>
+              <a:t> </a:t>
+            </a:r>
+            <a:r>
+              <a:rPr lang="en-US" sz="3500" dirty="0" smtClean="0">
+                <a:solidFill>
+                  <a:srgbClr val="00D8FF"/>
+                </a:solidFill>
+                <a:latin typeface="Consolas"/>
+                <a:cs typeface="Calibri"/>
+              </a:rPr>
+              <a:t> color: </a:t>
+            </a:r>
+            <a:r>
+              <a:rPr lang="en-US" sz="3500" dirty="0" err="1" smtClean="0">
+                <a:solidFill>
+                  <a:srgbClr val="00D8FF"/>
+                </a:solidFill>
+                <a:latin typeface="Consolas"/>
+                <a:cs typeface="Calibri"/>
+              </a:rPr>
+              <a:t>enum</a:t>
+            </a:r>
+            <a:r>
+              <a:rPr lang="en-US" sz="3500" dirty="0" smtClean="0">
+                <a:solidFill>
+                  <a:srgbClr val="00D8FF"/>
+                </a:solidFill>
+                <a:latin typeface="Consolas"/>
+                <a:cs typeface="Calibri"/>
+              </a:rPr>
+              <a:t>;</a:t>
+            </a:r>
+            <a:endParaRPr lang="en-US" sz="3500" dirty="0" smtClean="0">
+              <a:solidFill>
+                <a:srgbClr val="00D8FF"/>
+              </a:solidFill>
+              <a:latin typeface="Consolas"/>
+              <a:cs typeface="Calibri"/>
+            </a:endParaRPr>
+          </a:p>
+          <a:p>
+            <a:r>
+              <a:rPr lang="en-US" sz="3500" dirty="0">
+                <a:solidFill>
+                  <a:srgbClr val="00D8FF"/>
+                </a:solidFill>
+                <a:latin typeface="Consolas"/>
+                <a:cs typeface="Calibri"/>
+              </a:rPr>
+              <a:t> </a:t>
+            </a:r>
+            <a:r>
+              <a:rPr lang="en-US" sz="3500" dirty="0" smtClean="0">
+                <a:solidFill>
+                  <a:srgbClr val="00D8FF"/>
+                </a:solidFill>
+                <a:latin typeface="Consolas"/>
+                <a:cs typeface="Calibri"/>
+              </a:rPr>
+              <a:t> legs: </a:t>
+            </a:r>
+            <a:r>
+              <a:rPr lang="en-US" sz="3500" dirty="0" smtClean="0">
+                <a:solidFill>
+                  <a:srgbClr val="00D8FF"/>
+                </a:solidFill>
+                <a:latin typeface="Consolas"/>
+                <a:cs typeface="Calibri"/>
+              </a:rPr>
+              <a:t>number;</a:t>
+            </a:r>
+            <a:endParaRPr lang="en-US" sz="3500" dirty="0">
+              <a:solidFill>
+                <a:srgbClr val="00D8FF"/>
+              </a:solidFill>
+              <a:latin typeface="Consolas"/>
+              <a:cs typeface="Calibri"/>
+            </a:endParaRPr>
+          </a:p>
+          <a:p>
+            <a:r>
+              <a:rPr lang="en-US" sz="3500" dirty="0" smtClean="0">
+                <a:solidFill>
+                  <a:srgbClr val="00D8FF"/>
+                </a:solidFill>
+                <a:latin typeface="Consolas"/>
+                <a:cs typeface="Calibri"/>
+              </a:rPr>
+              <a:t>}</a:t>
+            </a:r>
+            <a:endParaRPr lang="en-US" sz="3500" dirty="0">
+              <a:solidFill>
+                <a:srgbClr val="00D8FF"/>
+              </a:solidFill>
+            </a:endParaRPr>
+          </a:p>
+        </p:txBody>
+      </p:sp>
+      <p:sp>
+        <p:nvSpPr>
+          <p:cNvPr id="11" name="Прямоугольник 10"/>
+          <p:cNvSpPr/>
+          <p:nvPr/>
+        </p:nvSpPr>
+        <p:spPr>
+          <a:xfrm>
+            <a:off x="3274667" y="2196785"/>
+            <a:ext cx="5862502" cy="2785378"/>
+          </a:xfrm>
+          <a:prstGeom prst="rect">
+            <a:avLst/>
+          </a:prstGeom>
+        </p:spPr>
+        <p:txBody>
+          <a:bodyPr wrap="none">
+            <a:spAutoFit/>
+          </a:bodyPr>
+          <a:lstStyle/>
+          <a:p>
+            <a:r>
+              <a:rPr lang="en-US" sz="3500" dirty="0" smtClean="0">
+                <a:solidFill>
+                  <a:srgbClr val="00D8FF"/>
+                </a:solidFill>
+                <a:latin typeface="Consolas"/>
+                <a:cs typeface="Calibri"/>
+              </a:rPr>
+              <a:t>type </a:t>
+            </a:r>
+            <a:r>
+              <a:rPr lang="en-US" sz="3500" dirty="0" err="1" smtClean="0">
+                <a:solidFill>
+                  <a:srgbClr val="BF4141"/>
+                </a:solidFill>
+                <a:latin typeface="Consolas"/>
+                <a:cs typeface="Calibri"/>
+              </a:rPr>
+              <a:t>Optional</a:t>
+            </a:r>
+            <a:r>
+              <a:rPr lang="en-US" sz="3500" dirty="0" err="1" smtClean="0">
+                <a:solidFill>
+                  <a:srgbClr val="BF4141"/>
+                </a:solidFill>
+                <a:latin typeface="Consolas"/>
+                <a:cs typeface="Calibri"/>
+              </a:rPr>
+              <a:t>Animal</a:t>
+            </a:r>
+            <a:r>
+              <a:rPr lang="en-US" sz="3500" dirty="0" smtClean="0">
+                <a:solidFill>
+                  <a:srgbClr val="00D8FF"/>
+                </a:solidFill>
+                <a:latin typeface="Consolas"/>
+                <a:cs typeface="Calibri"/>
+              </a:rPr>
+              <a:t> = {</a:t>
+            </a:r>
+            <a:endParaRPr lang="en-US" sz="3500" dirty="0" smtClean="0">
+              <a:solidFill>
+                <a:srgbClr val="00D8FF"/>
+              </a:solidFill>
+              <a:latin typeface="Consolas"/>
+              <a:cs typeface="Calibri"/>
+            </a:endParaRPr>
+          </a:p>
+          <a:p>
+            <a:r>
+              <a:rPr lang="en-US" sz="3500" dirty="0">
+                <a:solidFill>
+                  <a:srgbClr val="00D8FF"/>
+                </a:solidFill>
+                <a:latin typeface="Consolas"/>
+                <a:cs typeface="Calibri"/>
+              </a:rPr>
+              <a:t> </a:t>
+            </a:r>
+            <a:r>
+              <a:rPr lang="en-US" sz="3500" dirty="0" smtClean="0">
+                <a:solidFill>
+                  <a:srgbClr val="00D8FF"/>
+                </a:solidFill>
+                <a:latin typeface="Consolas"/>
+                <a:cs typeface="Calibri"/>
+              </a:rPr>
+              <a:t> </a:t>
+            </a:r>
+            <a:r>
+              <a:rPr lang="en-US" sz="3500" dirty="0" smtClean="0">
+                <a:solidFill>
+                  <a:srgbClr val="00D8FF"/>
+                </a:solidFill>
+                <a:latin typeface="Consolas"/>
+                <a:cs typeface="Calibri"/>
+              </a:rPr>
+              <a:t>name?: string;</a:t>
+            </a:r>
+            <a:endParaRPr lang="en-US" sz="3500" dirty="0" smtClean="0">
+              <a:solidFill>
+                <a:srgbClr val="00D8FF"/>
+              </a:solidFill>
+              <a:latin typeface="Consolas"/>
+              <a:cs typeface="Calibri"/>
+            </a:endParaRPr>
+          </a:p>
+          <a:p>
+            <a:r>
+              <a:rPr lang="en-US" sz="3500" dirty="0">
+                <a:solidFill>
+                  <a:srgbClr val="00D8FF"/>
+                </a:solidFill>
+                <a:latin typeface="Consolas"/>
+                <a:cs typeface="Calibri"/>
+              </a:rPr>
+              <a:t> </a:t>
+            </a:r>
+            <a:r>
+              <a:rPr lang="en-US" sz="3500" dirty="0" smtClean="0">
+                <a:solidFill>
+                  <a:srgbClr val="00D8FF"/>
+                </a:solidFill>
+                <a:latin typeface="Consolas"/>
+                <a:cs typeface="Calibri"/>
+              </a:rPr>
+              <a:t> </a:t>
+            </a:r>
+            <a:r>
+              <a:rPr lang="en-US" sz="3500" dirty="0" smtClean="0">
+                <a:solidFill>
+                  <a:srgbClr val="00D8FF"/>
+                </a:solidFill>
+                <a:latin typeface="Consolas"/>
+                <a:cs typeface="Calibri"/>
+              </a:rPr>
+              <a:t>color?: </a:t>
+            </a:r>
+            <a:r>
+              <a:rPr lang="en-US" sz="3500" dirty="0" err="1" smtClean="0">
+                <a:solidFill>
+                  <a:srgbClr val="00D8FF"/>
+                </a:solidFill>
+                <a:latin typeface="Consolas"/>
+                <a:cs typeface="Calibri"/>
+              </a:rPr>
+              <a:t>enum</a:t>
+            </a:r>
+            <a:r>
+              <a:rPr lang="en-US" sz="3500" dirty="0" smtClean="0">
+                <a:solidFill>
+                  <a:srgbClr val="00D8FF"/>
+                </a:solidFill>
+                <a:latin typeface="Consolas"/>
+                <a:cs typeface="Calibri"/>
+              </a:rPr>
+              <a:t>;</a:t>
+            </a:r>
+            <a:endParaRPr lang="en-US" sz="3500" dirty="0" smtClean="0">
+              <a:solidFill>
+                <a:srgbClr val="00D8FF"/>
+              </a:solidFill>
+              <a:latin typeface="Consolas"/>
+              <a:cs typeface="Calibri"/>
+            </a:endParaRPr>
+          </a:p>
+          <a:p>
+            <a:r>
+              <a:rPr lang="en-US" sz="3500" dirty="0">
+                <a:solidFill>
+                  <a:srgbClr val="00D8FF"/>
+                </a:solidFill>
+                <a:latin typeface="Consolas"/>
+                <a:cs typeface="Calibri"/>
+              </a:rPr>
+              <a:t> </a:t>
+            </a:r>
+            <a:r>
+              <a:rPr lang="en-US" sz="3500" dirty="0" smtClean="0">
+                <a:solidFill>
+                  <a:srgbClr val="00D8FF"/>
+                </a:solidFill>
+                <a:latin typeface="Consolas"/>
+                <a:cs typeface="Calibri"/>
+              </a:rPr>
+              <a:t> </a:t>
+            </a:r>
+            <a:r>
+              <a:rPr lang="en-US" sz="3500" dirty="0" smtClean="0">
+                <a:solidFill>
+                  <a:srgbClr val="00D8FF"/>
+                </a:solidFill>
+                <a:latin typeface="Consolas"/>
+                <a:cs typeface="Calibri"/>
+              </a:rPr>
+              <a:t>legs?: number;</a:t>
+            </a:r>
+            <a:endParaRPr lang="en-US" sz="3500" dirty="0">
+              <a:solidFill>
+                <a:srgbClr val="00D8FF"/>
+              </a:solidFill>
+              <a:latin typeface="Consolas"/>
+              <a:cs typeface="Calibri"/>
+            </a:endParaRPr>
+          </a:p>
+          <a:p>
+            <a:r>
+              <a:rPr lang="en-US" sz="3500" dirty="0" smtClean="0">
+                <a:solidFill>
+                  <a:srgbClr val="00D8FF"/>
+                </a:solidFill>
+                <a:latin typeface="Consolas"/>
+                <a:cs typeface="Calibri"/>
+              </a:rPr>
+              <a:t>}</a:t>
+            </a:r>
+            <a:endParaRPr lang="en-US" sz="3500" dirty="0">
+              <a:solidFill>
+                <a:srgbClr val="00D8FF"/>
+              </a:solidFill>
+            </a:endParaRPr>
+          </a:p>
+        </p:txBody>
+      </p:sp>
+    </p:spTree>
+    <p:extLst>
+      <p:ext uri="{BB962C8B-B14F-4D97-AF65-F5344CB8AC3E}">
+        <p14:creationId xmlns:p14="http://schemas.microsoft.com/office/powerpoint/2010/main" val="34231536"/>
+      </p:ext>
+    </p:extLst>
+  </p:cSld>
+  <p:clrMapOvr>
+    <a:masterClrMapping/>
+  </p:clrMapOvr>
+  <p:timing>
+    <p:tnLst>
+      <p:par>
+        <p:cTn id="1" dur="indefinite" restart="never" nodeType="tmRoot">
+          <p:childTnLst>
+            <p:seq concurrent="1" nextAc="seek">
+              <p:cTn id="2" dur="indefinite" nodeType="mainSeq">
+                <p:childTnLst>
+                  <p:par>
+                    <p:cTn id="3" fill="hold">
+                      <p:stCondLst>
+                        <p:cond delay="indefinite"/>
+                      </p:stCondLst>
+                      <p:childTnLst>
+                        <p:par>
+                          <p:cTn id="4" fill="hold">
+                            <p:stCondLst>
+                              <p:cond delay="0"/>
+                            </p:stCondLst>
+                            <p:childTnLst>
+                              <p:par>
+                                <p:cTn id="5" presetID="10" presetClass="exit" presetSubtype="0" fill="hold" grpId="0" nodeType="clickEffect">
+                                  <p:stCondLst>
+                                    <p:cond delay="0"/>
+                                  </p:stCondLst>
+                                  <p:childTnLst>
+                                    <p:animEffect transition="out" filter="fade">
+                                      <p:cBhvr>
+                                        <p:cTn id="6" dur="500"/>
+                                        <p:tgtEl>
+                                          <p:spTgt spid="10"/>
+                                        </p:tgtEl>
+                                      </p:cBhvr>
+                                    </p:animEffect>
+                                    <p:set>
+                                      <p:cBhvr>
+                                        <p:cTn id="7" dur="1" fill="hold">
+                                          <p:stCondLst>
+                                            <p:cond delay="499"/>
+                                          </p:stCondLst>
+                                        </p:cTn>
+                                        <p:tgtEl>
+                                          <p:spTgt spid="10"/>
+                                        </p:tgtEl>
+                                        <p:attrNameLst>
+                                          <p:attrName>style.visibility</p:attrName>
+                                        </p:attrNameLst>
+                                      </p:cBhvr>
+                                      <p:to>
+                                        <p:strVal val="hidden"/>
+                                      </p:to>
+                                    </p:set>
+                                  </p:childTnLst>
+                                </p:cTn>
+                              </p:par>
+                              <p:par>
+                                <p:cTn id="8" presetID="10" presetClass="entr" presetSubtype="0" fill="hold" grpId="0" nodeType="withEffect">
+                                  <p:stCondLst>
+                                    <p:cond delay="0"/>
+                                  </p:stCondLst>
+                                  <p:childTnLst>
+                                    <p:set>
+                                      <p:cBhvr>
+                                        <p:cTn id="9" dur="1" fill="hold">
+                                          <p:stCondLst>
+                                            <p:cond delay="0"/>
+                                          </p:stCondLst>
+                                        </p:cTn>
+                                        <p:tgtEl>
+                                          <p:spTgt spid="6"/>
+                                        </p:tgtEl>
+                                        <p:attrNameLst>
+                                          <p:attrName>style.visibility</p:attrName>
+                                        </p:attrNameLst>
+                                      </p:cBhvr>
+                                      <p:to>
+                                        <p:strVal val="visible"/>
+                                      </p:to>
+                                    </p:set>
+                                    <p:animEffect transition="in" filter="fade">
+                                      <p:cBhvr>
+                                        <p:cTn id="10" dur="500"/>
+                                        <p:tgtEl>
+                                          <p:spTgt spid="6"/>
+                                        </p:tgtEl>
+                                      </p:cBhvr>
+                                    </p:animEffect>
+                                  </p:childTnLst>
+                                </p:cTn>
+                              </p:par>
+                            </p:childTnLst>
+                          </p:cTn>
+                        </p:par>
+                      </p:childTnLst>
+                    </p:cTn>
+                  </p:par>
+                  <p:par>
+                    <p:cTn id="11" fill="hold">
+                      <p:stCondLst>
+                        <p:cond delay="indefinite"/>
+                      </p:stCondLst>
+                      <p:childTnLst>
+                        <p:par>
+                          <p:cTn id="12" fill="hold">
+                            <p:stCondLst>
+                              <p:cond delay="0"/>
+                            </p:stCondLst>
+                            <p:childTnLst>
+                              <p:par>
+                                <p:cTn id="13" presetID="10" presetClass="entr" presetSubtype="0" fill="hold" grpId="1" nodeType="clickEffect">
+                                  <p:stCondLst>
+                                    <p:cond delay="0"/>
+                                  </p:stCondLst>
+                                  <p:childTnLst>
+                                    <p:set>
+                                      <p:cBhvr>
+                                        <p:cTn id="14" dur="1" fill="hold">
+                                          <p:stCondLst>
+                                            <p:cond delay="0"/>
+                                          </p:stCondLst>
+                                        </p:cTn>
+                                        <p:tgtEl>
+                                          <p:spTgt spid="11"/>
+                                        </p:tgtEl>
+                                        <p:attrNameLst>
+                                          <p:attrName>style.visibility</p:attrName>
+                                        </p:attrNameLst>
+                                      </p:cBhvr>
+                                      <p:to>
+                                        <p:strVal val="visible"/>
+                                      </p:to>
+                                    </p:set>
+                                    <p:animEffect transition="in" filter="fade">
+                                      <p:cBhvr>
+                                        <p:cTn id="15" dur="500"/>
+                                        <p:tgtEl>
+                                          <p:spTgt spid="11"/>
+                                        </p:tgtEl>
+                                      </p:cBhvr>
+                                    </p:animEffect>
+                                  </p:childTnLst>
+                                </p:cTn>
+                              </p:par>
+                              <p:par>
+                                <p:cTn id="16" presetID="10" presetClass="exit" presetSubtype="0" fill="hold" grpId="1" nodeType="withEffect">
+                                  <p:stCondLst>
+                                    <p:cond delay="0"/>
+                                  </p:stCondLst>
+                                  <p:childTnLst>
+                                    <p:animEffect transition="out" filter="fade">
+                                      <p:cBhvr>
+                                        <p:cTn id="17" dur="500"/>
+                                        <p:tgtEl>
+                                          <p:spTgt spid="6"/>
+                                        </p:tgtEl>
+                                      </p:cBhvr>
+                                    </p:animEffect>
+                                    <p:set>
+                                      <p:cBhvr>
+                                        <p:cTn id="18" dur="1" fill="hold">
+                                          <p:stCondLst>
+                                            <p:cond delay="499"/>
+                                          </p:stCondLst>
+                                        </p:cTn>
+                                        <p:tgtEl>
+                                          <p:spTgt spid="6"/>
+                                        </p:tgtEl>
+                                        <p:attrNameLst>
+                                          <p:attrName>style.visibility</p:attrName>
+                                        </p:attrNameLst>
+                                      </p:cBhvr>
+                                      <p:to>
+                                        <p:strVal val="hidden"/>
+                                      </p:to>
+                                    </p:set>
+                                  </p:childTnLst>
+                                </p:cTn>
+                              </p:par>
+                            </p:childTnLst>
+                          </p:cTn>
+                        </p:par>
+                      </p:childTnLst>
+                    </p:cTn>
+                  </p:par>
+                </p:childTnLst>
+              </p:cTn>
+              <p:prevCondLst>
+                <p:cond evt="onPrev" delay="0">
+                  <p:tgtEl>
+                    <p:sldTgt/>
+                  </p:tgtEl>
+                </p:cond>
+              </p:prevCondLst>
+              <p:nextCondLst>
+                <p:cond evt="onNext" delay="0">
+                  <p:tgtEl>
+                    <p:sldTgt/>
+                  </p:tgtEl>
+                </p:cond>
+              </p:nextCondLst>
+            </p:seq>
+          </p:childTnLst>
+        </p:cTn>
+      </p:par>
+    </p:tnLst>
+    <p:bldLst>
+      <p:bldP spid="6" grpId="0"/>
+      <p:bldP spid="6" grpId="1"/>
+      <p:bldP spid="10" grpId="0"/>
+      <p:bldP spid="11" grpId="1"/>
+    </p:bldLst>
+  </p:timing>
+</p:sld>
+</file>
+
+<file path=ppt/slides/slide132.xml><?xml version="1.0" encoding="utf-8"?>
+<p:sld xmlns:a="http://schemas.openxmlformats.org/drawingml/2006/main" xmlns:r="http://schemas.openxmlformats.org/officeDocument/2006/relationships" xmlns:p="http://schemas.openxmlformats.org/presentationml/2006/main">
+  <p:cSld>
+    <p:bg>
+      <p:bgPr>
+        <a:solidFill>
+          <a:srgbClr val="262626"/>
+        </a:solidFill>
+        <a:effectLst/>
+      </p:bgPr>
+    </p:bg>
+    <p:spTree>
+      <p:nvGrpSpPr>
+        <p:cNvPr id="1" name=""/>
+        <p:cNvGrpSpPr/>
+        <p:nvPr/>
+      </p:nvGrpSpPr>
+      <p:grpSpPr>
+        <a:xfrm>
+          <a:off x="0" y="0"/>
+          <a:ext cx="0" cy="0"/>
+          <a:chOff x="0" y="0"/>
+          <a:chExt cx="0" cy="0"/>
+        </a:xfrm>
+      </p:grpSpPr>
+      <p:sp>
+        <p:nvSpPr>
+          <p:cNvPr id="5" name="Прямоугольник 4"/>
+          <p:cNvSpPr/>
+          <p:nvPr/>
+        </p:nvSpPr>
+        <p:spPr>
+          <a:xfrm>
+            <a:off x="2200779" y="3217510"/>
+            <a:ext cx="8263416" cy="707886"/>
+          </a:xfrm>
+          <a:prstGeom prst="rect">
+            <a:avLst/>
+          </a:prstGeom>
+        </p:spPr>
+        <p:txBody>
+          <a:bodyPr wrap="none">
+            <a:spAutoFit/>
+          </a:bodyPr>
+          <a:lstStyle/>
+          <a:p>
+            <a:r>
+              <a:rPr lang="en-US" sz="4000" dirty="0">
+                <a:solidFill>
+                  <a:srgbClr val="00D8FF"/>
+                </a:solidFill>
+              </a:rPr>
+              <a:t>‘function</a:t>
+            </a:r>
+            <a:r>
+              <a:rPr lang="en-US" sz="4000" dirty="0" smtClean="0">
+                <a:solidFill>
+                  <a:srgbClr val="00D8FF"/>
+                </a:solidFill>
+              </a:rPr>
+              <a:t>’ y(x: </a:t>
+            </a:r>
+            <a:r>
+              <a:rPr lang="en-US" sz="4000" dirty="0" smtClean="0">
+                <a:solidFill>
+                  <a:srgbClr val="BF4141"/>
+                </a:solidFill>
+              </a:rPr>
+              <a:t>type</a:t>
+            </a:r>
+            <a:r>
+              <a:rPr lang="en-US" sz="4000" dirty="0" smtClean="0">
+                <a:solidFill>
+                  <a:srgbClr val="00D8FF"/>
+                </a:solidFill>
+              </a:rPr>
+              <a:t>): </a:t>
+            </a:r>
+            <a:r>
+              <a:rPr lang="en-US" sz="4000" dirty="0" err="1" smtClean="0">
+                <a:solidFill>
+                  <a:srgbClr val="BF4141"/>
+                </a:solidFill>
+              </a:rPr>
+              <a:t>transformed_type</a:t>
+            </a:r>
+            <a:endParaRPr lang="en-US" sz="4000" dirty="0">
+              <a:solidFill>
+                <a:srgbClr val="BF4141"/>
+              </a:solidFill>
+            </a:endParaRPr>
+          </a:p>
+        </p:txBody>
+      </p:sp>
+    </p:spTree>
+    <p:extLst>
+      <p:ext uri="{BB962C8B-B14F-4D97-AF65-F5344CB8AC3E}">
+        <p14:creationId xmlns:p14="http://schemas.microsoft.com/office/powerpoint/2010/main" val="1981163509"/>
+      </p:ext>
+    </p:extLst>
+  </p:cSld>
+  <p:clrMapOvr>
+    <a:masterClrMapping/>
+  </p:clrMapOvr>
+  <p:timing>
+    <p:tnLst>
+      <p:par>
+        <p:cTn id="1" dur="indefinite" restart="never" nodeType="tmRoot">
+          <p:childTnLst>
+            <p:seq concurrent="1" nextAc="seek">
+              <p:cTn id="2" dur="indefinite" nodeType="mainSeq">
+                <p:childTnLst>
+                  <p:par>
+                    <p:cTn id="3" fill="hold">
+                      <p:stCondLst>
+                        <p:cond delay="indefinite"/>
+                      </p:stCondLst>
+                      <p:childTnLst>
+                        <p:par>
+                          <p:cTn id="4" fill="hold">
+                            <p:stCondLst>
+                              <p:cond delay="0"/>
+                            </p:stCondLst>
+                            <p:childTnLst>
+                              <p:par>
+                                <p:cTn id="5" presetID="10" presetClass="entr" presetSubtype="0" fill="hold" grpId="0" nodeType="clickEffect">
+                                  <p:stCondLst>
+                                    <p:cond delay="0"/>
+                                  </p:stCondLst>
+                                  <p:childTnLst>
+                                    <p:set>
+                                      <p:cBhvr>
+                                        <p:cTn id="6" dur="1" fill="hold">
+                                          <p:stCondLst>
+                                            <p:cond delay="0"/>
+                                          </p:stCondLst>
+                                        </p:cTn>
+                                        <p:tgtEl>
+                                          <p:spTgt spid="5"/>
+                                        </p:tgtEl>
+                                        <p:attrNameLst>
+                                          <p:attrName>style.visibility</p:attrName>
+                                        </p:attrNameLst>
+                                      </p:cBhvr>
+                                      <p:to>
+                                        <p:strVal val="visible"/>
+                                      </p:to>
+                                    </p:set>
+                                    <p:animEffect transition="in" filter="fade">
+                                      <p:cBhvr>
+                                        <p:cTn id="7" dur="500"/>
+                                        <p:tgtEl>
+                                          <p:spTgt spid="5"/>
+                                        </p:tgtEl>
+                                      </p:cBhvr>
+                                    </p:animEffect>
+                                  </p:childTnLst>
+                                </p:cTn>
+                              </p:par>
+                            </p:childTnLst>
+                          </p:cTn>
+                        </p:par>
+                      </p:childTnLst>
+                    </p:cTn>
+                  </p:par>
+                </p:childTnLst>
+              </p:cTn>
+              <p:prevCondLst>
+                <p:cond evt="onPrev" delay="0">
+                  <p:tgtEl>
+                    <p:sldTgt/>
+                  </p:tgtEl>
+                </p:cond>
+              </p:prevCondLst>
+              <p:nextCondLst>
+                <p:cond evt="onNext" delay="0">
+                  <p:tgtEl>
+                    <p:sldTgt/>
+                  </p:tgtEl>
+                </p:cond>
+              </p:nextCondLst>
+            </p:seq>
+          </p:childTnLst>
+        </p:cTn>
+      </p:par>
+    </p:tnLst>
+    <p:bldLst>
+      <p:bldP spid="5" grpId="0"/>
+    </p:bldLst>
+  </p:timing>
 </p:sld>
 </file>
 

</xml_diff>